<commit_message>
Fix Bayesian notation and upload Huang's ACL2018 report.
</commit_message>
<xml_diff>
--- a/Slides/Valency-Augmented Dependency Parsing.pptx
+++ b/Slides/Valency-Augmented Dependency Parsing.pptx
@@ -215,7 +215,7 @@
           <a:p>
             <a:fld id="{F1CF549D-2847-4717-AF85-8CBFF90D5328}" type="datetimeFigureOut">
               <a:rPr lang="zh-CN" altLang="en-US" smtClean="0"/>
-              <a:t>2018/9/6 Thursday</a:t>
+              <a:t>2018/9/11 Tuesday</a:t>
             </a:fld>
             <a:endParaRPr lang="zh-CN" altLang="en-US"/>
           </a:p>
@@ -1273,7 +1273,7 @@
           <a:p>
             <a:fld id="{1A7E15E9-9860-48BF-AF0E-70BB04904F89}" type="datetimeFigureOut">
               <a:rPr lang="zh-CN" altLang="en-US" smtClean="0"/>
-              <a:t>2018/9/6 Thursday</a:t>
+              <a:t>2018/9/11 Tuesday</a:t>
             </a:fld>
             <a:endParaRPr lang="zh-CN" altLang="en-US"/>
           </a:p>
@@ -1443,7 +1443,7 @@
           <a:p>
             <a:fld id="{1A7E15E9-9860-48BF-AF0E-70BB04904F89}" type="datetimeFigureOut">
               <a:rPr lang="zh-CN" altLang="en-US" smtClean="0"/>
-              <a:t>2018/9/6 Thursday</a:t>
+              <a:t>2018/9/11 Tuesday</a:t>
             </a:fld>
             <a:endParaRPr lang="zh-CN" altLang="en-US"/>
           </a:p>
@@ -1623,7 +1623,7 @@
           <a:p>
             <a:fld id="{1A7E15E9-9860-48BF-AF0E-70BB04904F89}" type="datetimeFigureOut">
               <a:rPr lang="zh-CN" altLang="en-US" smtClean="0"/>
-              <a:t>2018/9/6 Thursday</a:t>
+              <a:t>2018/9/11 Tuesday</a:t>
             </a:fld>
             <a:endParaRPr lang="zh-CN" altLang="en-US"/>
           </a:p>
@@ -1793,7 +1793,7 @@
           <a:p>
             <a:fld id="{1A7E15E9-9860-48BF-AF0E-70BB04904F89}" type="datetimeFigureOut">
               <a:rPr lang="zh-CN" altLang="en-US" smtClean="0"/>
-              <a:t>2018/9/6 Thursday</a:t>
+              <a:t>2018/9/11 Tuesday</a:t>
             </a:fld>
             <a:endParaRPr lang="zh-CN" altLang="en-US"/>
           </a:p>
@@ -2039,7 +2039,7 @@
           <a:p>
             <a:fld id="{1A7E15E9-9860-48BF-AF0E-70BB04904F89}" type="datetimeFigureOut">
               <a:rPr lang="zh-CN" altLang="en-US" smtClean="0"/>
-              <a:t>2018/9/6 Thursday</a:t>
+              <a:t>2018/9/11 Tuesday</a:t>
             </a:fld>
             <a:endParaRPr lang="zh-CN" altLang="en-US"/>
           </a:p>
@@ -2271,7 +2271,7 @@
           <a:p>
             <a:fld id="{1A7E15E9-9860-48BF-AF0E-70BB04904F89}" type="datetimeFigureOut">
               <a:rPr lang="zh-CN" altLang="en-US" smtClean="0"/>
-              <a:t>2018/9/6 Thursday</a:t>
+              <a:t>2018/9/11 Tuesday</a:t>
             </a:fld>
             <a:endParaRPr lang="zh-CN" altLang="en-US"/>
           </a:p>
@@ -2638,7 +2638,7 @@
           <a:p>
             <a:fld id="{1A7E15E9-9860-48BF-AF0E-70BB04904F89}" type="datetimeFigureOut">
               <a:rPr lang="zh-CN" altLang="en-US" smtClean="0"/>
-              <a:t>2018/9/6 Thursday</a:t>
+              <a:t>2018/9/11 Tuesday</a:t>
             </a:fld>
             <a:endParaRPr lang="zh-CN" altLang="en-US"/>
           </a:p>
@@ -2756,7 +2756,7 @@
           <a:p>
             <a:fld id="{1A7E15E9-9860-48BF-AF0E-70BB04904F89}" type="datetimeFigureOut">
               <a:rPr lang="zh-CN" altLang="en-US" smtClean="0"/>
-              <a:t>2018/9/6 Thursday</a:t>
+              <a:t>2018/9/11 Tuesday</a:t>
             </a:fld>
             <a:endParaRPr lang="zh-CN" altLang="en-US"/>
           </a:p>
@@ -2851,7 +2851,7 @@
           <a:p>
             <a:fld id="{1A7E15E9-9860-48BF-AF0E-70BB04904F89}" type="datetimeFigureOut">
               <a:rPr lang="zh-CN" altLang="en-US" smtClean="0"/>
-              <a:t>2018/9/6 Thursday</a:t>
+              <a:t>2018/9/11 Tuesday</a:t>
             </a:fld>
             <a:endParaRPr lang="zh-CN" altLang="en-US"/>
           </a:p>
@@ -3128,7 +3128,7 @@
           <a:p>
             <a:fld id="{1A7E15E9-9860-48BF-AF0E-70BB04904F89}" type="datetimeFigureOut">
               <a:rPr lang="zh-CN" altLang="en-US" smtClean="0"/>
-              <a:t>2018/9/6 Thursday</a:t>
+              <a:t>2018/9/11 Tuesday</a:t>
             </a:fld>
             <a:endParaRPr lang="zh-CN" altLang="en-US"/>
           </a:p>
@@ -3381,7 +3381,7 @@
           <a:p>
             <a:fld id="{1A7E15E9-9860-48BF-AF0E-70BB04904F89}" type="datetimeFigureOut">
               <a:rPr lang="zh-CN" altLang="en-US" smtClean="0"/>
-              <a:t>2018/9/6 Thursday</a:t>
+              <a:t>2018/9/11 Tuesday</a:t>
             </a:fld>
             <a:endParaRPr lang="zh-CN" altLang="en-US"/>
           </a:p>
@@ -3594,7 +3594,7 @@
           <a:p>
             <a:fld id="{1A7E15E9-9860-48BF-AF0E-70BB04904F89}" type="datetimeFigureOut">
               <a:rPr lang="zh-CN" altLang="en-US" smtClean="0"/>
-              <a:t>2018/9/6 Thursday</a:t>
+              <a:t>2018/9/11 Tuesday</a:t>
             </a:fld>
             <a:endParaRPr lang="zh-CN" altLang="en-US"/>
           </a:p>

</xml_diff>